<commit_message>
latest pull from main
</commit_message>
<xml_diff>
--- a/Task 4/GROUP_1.pptx
+++ b/Task 4/GROUP_1.pptx
@@ -465,7 +465,7 @@
           <a:p>
             <a:fld id="{5F05F2BD-1DF2-4616-87F3-275353B3DB67}" type="datetimeFigureOut">
               <a:rPr lang="en-US" smtClean="0"/>
-              <a:t>5/27/2024</a:t>
+              <a:t>5/28/2024</a:t>
             </a:fld>
             <a:endParaRPr lang="en-US"/>
           </a:p>
@@ -1553,7 +1553,7 @@
           <a:p>
             <a:fld id="{5F05F2BD-1DF2-4616-87F3-275353B3DB67}" type="datetimeFigureOut">
               <a:rPr lang="en-US" smtClean="0"/>
-              <a:t>5/27/2024</a:t>
+              <a:t>5/28/2024</a:t>
             </a:fld>
             <a:endParaRPr lang="en-US"/>
           </a:p>
@@ -2533,7 +2533,7 @@
           <a:p>
             <a:fld id="{5F05F2BD-1DF2-4616-87F3-275353B3DB67}" type="datetimeFigureOut">
               <a:rPr lang="en-US" smtClean="0"/>
-              <a:t>5/27/2024</a:t>
+              <a:t>5/28/2024</a:t>
             </a:fld>
             <a:endParaRPr lang="en-US"/>
           </a:p>
@@ -3667,7 +3667,7 @@
           <a:p>
             <a:fld id="{5F05F2BD-1DF2-4616-87F3-275353B3DB67}" type="datetimeFigureOut">
               <a:rPr lang="en-US" smtClean="0"/>
-              <a:t>5/27/2024</a:t>
+              <a:t>5/28/2024</a:t>
             </a:fld>
             <a:endParaRPr lang="en-US"/>
           </a:p>
@@ -4700,7 +4700,7 @@
           <a:p>
             <a:fld id="{5F05F2BD-1DF2-4616-87F3-275353B3DB67}" type="datetimeFigureOut">
               <a:rPr lang="en-US" smtClean="0"/>
-              <a:t>5/27/2024</a:t>
+              <a:t>5/28/2024</a:t>
             </a:fld>
             <a:endParaRPr lang="en-US"/>
           </a:p>
@@ -5360,7 +5360,7 @@
           <a:p>
             <a:fld id="{5F05F2BD-1DF2-4616-87F3-275353B3DB67}" type="datetimeFigureOut">
               <a:rPr lang="en-US" smtClean="0"/>
-              <a:t>5/27/2024</a:t>
+              <a:t>5/28/2024</a:t>
             </a:fld>
             <a:endParaRPr lang="en-US"/>
           </a:p>
@@ -6221,7 +6221,7 @@
           <a:p>
             <a:fld id="{5F05F2BD-1DF2-4616-87F3-275353B3DB67}" type="datetimeFigureOut">
               <a:rPr lang="en-US" smtClean="0"/>
-              <a:t>5/27/2024</a:t>
+              <a:t>5/28/2024</a:t>
             </a:fld>
             <a:endParaRPr lang="en-US"/>
           </a:p>
@@ -6411,7 +6411,7 @@
           <a:p>
             <a:fld id="{5F05F2BD-1DF2-4616-87F3-275353B3DB67}" type="datetimeFigureOut">
               <a:rPr lang="en-US" smtClean="0"/>
-              <a:t>5/27/2024</a:t>
+              <a:t>5/28/2024</a:t>
             </a:fld>
             <a:endParaRPr lang="en-US"/>
           </a:p>
@@ -7383,7 +7383,7 @@
           <a:p>
             <a:fld id="{5F05F2BD-1DF2-4616-87F3-275353B3DB67}" type="datetimeFigureOut">
               <a:rPr lang="en-US" smtClean="0"/>
-              <a:t>5/27/2024</a:t>
+              <a:t>5/28/2024</a:t>
             </a:fld>
             <a:endParaRPr lang="en-US"/>
           </a:p>
@@ -7594,7 +7594,7 @@
           <a:p>
             <a:fld id="{5F05F2BD-1DF2-4616-87F3-275353B3DB67}" type="datetimeFigureOut">
               <a:rPr lang="en-US" smtClean="0"/>
-              <a:t>5/27/2024</a:t>
+              <a:t>5/28/2024</a:t>
             </a:fld>
             <a:endParaRPr lang="en-US"/>
           </a:p>
@@ -8628,7 +8628,7 @@
           <a:p>
             <a:fld id="{5F05F2BD-1DF2-4616-87F3-275353B3DB67}" type="datetimeFigureOut">
               <a:rPr lang="en-US" smtClean="0"/>
-              <a:t>5/27/2024</a:t>
+              <a:t>5/28/2024</a:t>
             </a:fld>
             <a:endParaRPr lang="en-US"/>
           </a:p>
@@ -8900,7 +8900,7 @@
           <a:p>
             <a:fld id="{5F05F2BD-1DF2-4616-87F3-275353B3DB67}" type="datetimeFigureOut">
               <a:rPr lang="en-US" smtClean="0"/>
-              <a:t>5/27/2024</a:t>
+              <a:t>5/28/2024</a:t>
             </a:fld>
             <a:endParaRPr lang="en-US"/>
           </a:p>
@@ -9310,7 +9310,7 @@
           <a:p>
             <a:fld id="{5F05F2BD-1DF2-4616-87F3-275353B3DB67}" type="datetimeFigureOut">
               <a:rPr lang="en-US" smtClean="0"/>
-              <a:t>5/27/2024</a:t>
+              <a:t>5/28/2024</a:t>
             </a:fld>
             <a:endParaRPr lang="en-US"/>
           </a:p>
@@ -9437,7 +9437,7 @@
           <a:p>
             <a:fld id="{5F05F2BD-1DF2-4616-87F3-275353B3DB67}" type="datetimeFigureOut">
               <a:rPr lang="en-US" smtClean="0"/>
-              <a:t>5/27/2024</a:t>
+              <a:t>5/28/2024</a:t>
             </a:fld>
             <a:endParaRPr lang="en-US"/>
           </a:p>
@@ -9532,7 +9532,7 @@
           <a:p>
             <a:fld id="{5F05F2BD-1DF2-4616-87F3-275353B3DB67}" type="datetimeFigureOut">
               <a:rPr lang="en-US" smtClean="0"/>
-              <a:t>5/27/2024</a:t>
+              <a:t>5/28/2024</a:t>
             </a:fld>
             <a:endParaRPr lang="en-US"/>
           </a:p>
@@ -10613,7 +10613,7 @@
           <a:p>
             <a:fld id="{5F05F2BD-1DF2-4616-87F3-275353B3DB67}" type="datetimeFigureOut">
               <a:rPr lang="en-US" smtClean="0"/>
-              <a:t>5/27/2024</a:t>
+              <a:t>5/28/2024</a:t>
             </a:fld>
             <a:endParaRPr lang="en-US"/>
           </a:p>
@@ -11721,7 +11721,7 @@
           <a:p>
             <a:fld id="{5F05F2BD-1DF2-4616-87F3-275353B3DB67}" type="datetimeFigureOut">
               <a:rPr lang="en-US" smtClean="0"/>
-              <a:t>5/27/2024</a:t>
+              <a:t>5/28/2024</a:t>
             </a:fld>
             <a:endParaRPr lang="en-US"/>
           </a:p>
@@ -12718,7 +12718,7 @@
           <a:p>
             <a:fld id="{5F05F2BD-1DF2-4616-87F3-275353B3DB67}" type="datetimeFigureOut">
               <a:rPr lang="en-US" smtClean="0"/>
-              <a:t>5/27/2024</a:t>
+              <a:t>5/28/2024</a:t>
             </a:fld>
             <a:endParaRPr lang="en-US"/>
           </a:p>
@@ -13351,13 +13351,13 @@
         </p:spPr>
         <p:txBody>
           <a:bodyPr>
-            <a:normAutofit/>
+            <a:normAutofit fontScale="92500"/>
           </a:bodyPr>
           <a:lstStyle/>
           <a:p>
             <a:r>
               <a:rPr lang="en-US" sz="3600" dirty="0"/>
-              <a:t> task 3: requirements analysis </a:t>
+              <a:t> task 4: system design and modelling </a:t>
             </a:r>
           </a:p>
         </p:txBody>
@@ -13833,6 +13833,197 @@
           </a:p>
         </p:txBody>
       </p:sp>
+      <p:sp>
+        <p:nvSpPr>
+          <p:cNvPr id="4" name="Rectangle 3">
+            <a:extLst>
+              <a:ext uri="{FF2B5EF4-FFF2-40B4-BE49-F238E27FC236}">
+                <a16:creationId xmlns:a16="http://schemas.microsoft.com/office/drawing/2014/main" id="{9D8B2A00-B504-45A5-8A7B-3EC620227AC1}"/>
+              </a:ext>
+            </a:extLst>
+          </p:cNvPr>
+          <p:cNvSpPr/>
+          <p:nvPr/>
+        </p:nvSpPr>
+        <p:spPr>
+          <a:xfrm>
+            <a:off x="6884710" y="1970202"/>
+            <a:ext cx="4700834" cy="3921551"/>
+          </a:xfrm>
+          <a:prstGeom prst="rect">
+            <a:avLst/>
+          </a:prstGeom>
+          <a:noFill/>
+          <a:ln>
+            <a:noFill/>
+          </a:ln>
+        </p:spPr>
+        <p:style>
+          <a:lnRef idx="2">
+            <a:schemeClr val="accent1">
+              <a:shade val="50000"/>
+            </a:schemeClr>
+          </a:lnRef>
+          <a:fillRef idx="1">
+            <a:schemeClr val="accent1"/>
+          </a:fillRef>
+          <a:effectRef idx="0">
+            <a:schemeClr val="accent1"/>
+          </a:effectRef>
+          <a:fontRef idx="minor">
+            <a:schemeClr val="lt1"/>
+          </a:fontRef>
+        </p:style>
+        <p:txBody>
+          <a:bodyPr rtlCol="0" anchor="ctr"/>
+          <a:lstStyle/>
+          <a:p>
+            <a:pPr marL="457200" marR="0" lvl="0" indent="-457200" algn="l" defTabSz="914400" rtl="0" eaLnBrk="1" fontAlgn="auto" latinLnBrk="0" hangingPunct="1">
+              <a:lnSpc>
+                <a:spcPct val="120000"/>
+              </a:lnSpc>
+              <a:spcBef>
+                <a:spcPts val="1000"/>
+              </a:spcBef>
+              <a:spcAft>
+                <a:spcPts val="0"/>
+              </a:spcAft>
+              <a:buClr>
+                <a:srgbClr val="B71E42"/>
+              </a:buClr>
+              <a:buSzPct val="100000"/>
+              <a:buFont typeface="Wingdings" panose="05000000000000000000" pitchFamily="2" charset="2"/>
+              <a:buChar char="q"/>
+              <a:tabLst/>
+              <a:defRPr/>
+            </a:pPr>
+            <a:r>
+              <a:rPr lang="en-US" sz="3200" dirty="0">
+                <a:solidFill>
+                  <a:prstClr val="black"/>
+                </a:solidFill>
+                <a:latin typeface="Gill Sans MT" panose="020B0502020104020203"/>
+              </a:rPr>
+              <a:t>Participants (entities)</a:t>
+            </a:r>
+          </a:p>
+          <a:p>
+            <a:pPr marL="457200" marR="0" lvl="0" indent="-457200" algn="l" defTabSz="914400" rtl="0" eaLnBrk="1" fontAlgn="auto" latinLnBrk="0" hangingPunct="1">
+              <a:lnSpc>
+                <a:spcPct val="120000"/>
+              </a:lnSpc>
+              <a:spcBef>
+                <a:spcPts val="1000"/>
+              </a:spcBef>
+              <a:spcAft>
+                <a:spcPts val="0"/>
+              </a:spcAft>
+              <a:buClr>
+                <a:srgbClr val="B71E42"/>
+              </a:buClr>
+              <a:buSzPct val="100000"/>
+              <a:buFont typeface="Wingdings" panose="05000000000000000000" pitchFamily="2" charset="2"/>
+              <a:buChar char="q"/>
+              <a:tabLst/>
+              <a:defRPr/>
+            </a:pPr>
+            <a:r>
+              <a:rPr lang="en-US" sz="3200" dirty="0">
+                <a:solidFill>
+                  <a:prstClr val="black"/>
+                </a:solidFill>
+                <a:latin typeface="Gill Sans MT" panose="020B0502020104020203"/>
+              </a:rPr>
+              <a:t>Sequencing (order) </a:t>
+            </a:r>
+          </a:p>
+          <a:p>
+            <a:pPr marL="457200" marR="0" lvl="0" indent="-457200" algn="l" defTabSz="914400" rtl="0" eaLnBrk="1" fontAlgn="auto" latinLnBrk="0" hangingPunct="1">
+              <a:lnSpc>
+                <a:spcPct val="120000"/>
+              </a:lnSpc>
+              <a:spcBef>
+                <a:spcPts val="1000"/>
+              </a:spcBef>
+              <a:spcAft>
+                <a:spcPts val="0"/>
+              </a:spcAft>
+              <a:buClr>
+                <a:srgbClr val="B71E42"/>
+              </a:buClr>
+              <a:buSzPct val="100000"/>
+              <a:buFont typeface="Wingdings" panose="05000000000000000000" pitchFamily="2" charset="2"/>
+              <a:buChar char="q"/>
+              <a:tabLst/>
+              <a:defRPr/>
+            </a:pPr>
+            <a:r>
+              <a:rPr lang="en-US" sz="3200" dirty="0">
+                <a:solidFill>
+                  <a:prstClr val="black"/>
+                </a:solidFill>
+                <a:latin typeface="Gill Sans MT" panose="020B0502020104020203"/>
+              </a:rPr>
+              <a:t>Interactions</a:t>
+            </a:r>
+          </a:p>
+          <a:p>
+            <a:pPr marL="457200" marR="0" lvl="0" indent="-457200" algn="l" defTabSz="914400" rtl="0" eaLnBrk="1" fontAlgn="auto" latinLnBrk="0" hangingPunct="1">
+              <a:lnSpc>
+                <a:spcPct val="120000"/>
+              </a:lnSpc>
+              <a:spcBef>
+                <a:spcPts val="1000"/>
+              </a:spcBef>
+              <a:spcAft>
+                <a:spcPts val="0"/>
+              </a:spcAft>
+              <a:buClr>
+                <a:srgbClr val="B71E42"/>
+              </a:buClr>
+              <a:buSzPct val="100000"/>
+              <a:buFont typeface="Wingdings" panose="05000000000000000000" pitchFamily="2" charset="2"/>
+              <a:buChar char="q"/>
+              <a:tabLst/>
+              <a:defRPr/>
+            </a:pPr>
+            <a:r>
+              <a:rPr lang="en-US" sz="3200" dirty="0">
+                <a:solidFill>
+                  <a:prstClr val="black"/>
+                </a:solidFill>
+                <a:latin typeface="Gill Sans MT" panose="020B0502020104020203"/>
+              </a:rPr>
+              <a:t>Messages </a:t>
+            </a:r>
+          </a:p>
+          <a:p>
+            <a:pPr marR="0" lvl="0" algn="l" defTabSz="914400" rtl="0" eaLnBrk="1" fontAlgn="auto" latinLnBrk="0" hangingPunct="1">
+              <a:lnSpc>
+                <a:spcPct val="120000"/>
+              </a:lnSpc>
+              <a:spcBef>
+                <a:spcPts val="1000"/>
+              </a:spcBef>
+              <a:spcAft>
+                <a:spcPts val="0"/>
+              </a:spcAft>
+              <a:buClr>
+                <a:srgbClr val="B71E42"/>
+              </a:buClr>
+              <a:buSzPct val="100000"/>
+              <a:tabLst/>
+              <a:defRPr/>
+            </a:pPr>
+            <a:endParaRPr lang="en-US" sz="4400" dirty="0">
+              <a:solidFill>
+                <a:prstClr val="black"/>
+              </a:solidFill>
+              <a:latin typeface="Gill Sans MT" panose="020B0502020104020203"/>
+            </a:endParaRPr>
+          </a:p>
+        </p:txBody>
+      </p:sp>
     </p:spTree>
     <p:extLst>
       <p:ext uri="{BB962C8B-B14F-4D97-AF65-F5344CB8AC3E}">
@@ -14031,6 +14222,197 @@
               </a:solidFill>
               <a:latin typeface="Gill Sans MT" panose="020B0502020104020203"/>
             </a:endParaRPr>
+          </a:p>
+          <a:p>
+            <a:pPr marR="0" lvl="0" algn="l" defTabSz="914400" rtl="0" eaLnBrk="1" fontAlgn="auto" latinLnBrk="0" hangingPunct="1">
+              <a:lnSpc>
+                <a:spcPct val="120000"/>
+              </a:lnSpc>
+              <a:spcBef>
+                <a:spcPts val="1000"/>
+              </a:spcBef>
+              <a:spcAft>
+                <a:spcPts val="0"/>
+              </a:spcAft>
+              <a:buClr>
+                <a:srgbClr val="B71E42"/>
+              </a:buClr>
+              <a:buSzPct val="100000"/>
+              <a:tabLst/>
+              <a:defRPr/>
+            </a:pPr>
+            <a:endParaRPr lang="en-US" sz="4400" dirty="0">
+              <a:solidFill>
+                <a:prstClr val="black"/>
+              </a:solidFill>
+              <a:latin typeface="Gill Sans MT" panose="020B0502020104020203"/>
+            </a:endParaRPr>
+          </a:p>
+        </p:txBody>
+      </p:sp>
+      <p:sp>
+        <p:nvSpPr>
+          <p:cNvPr id="4" name="Rectangle 3">
+            <a:extLst>
+              <a:ext uri="{FF2B5EF4-FFF2-40B4-BE49-F238E27FC236}">
+                <a16:creationId xmlns:a16="http://schemas.microsoft.com/office/drawing/2014/main" id="{CB51F90C-3AAD-48FC-956A-72986A5CB522}"/>
+              </a:ext>
+            </a:extLst>
+          </p:cNvPr>
+          <p:cNvSpPr/>
+          <p:nvPr/>
+        </p:nvSpPr>
+        <p:spPr>
+          <a:xfrm>
+            <a:off x="6903563" y="1866506"/>
+            <a:ext cx="4700834" cy="3921551"/>
+          </a:xfrm>
+          <a:prstGeom prst="rect">
+            <a:avLst/>
+          </a:prstGeom>
+          <a:noFill/>
+          <a:ln>
+            <a:noFill/>
+          </a:ln>
+        </p:spPr>
+        <p:style>
+          <a:lnRef idx="2">
+            <a:schemeClr val="accent1">
+              <a:shade val="50000"/>
+            </a:schemeClr>
+          </a:lnRef>
+          <a:fillRef idx="1">
+            <a:schemeClr val="accent1"/>
+          </a:fillRef>
+          <a:effectRef idx="0">
+            <a:schemeClr val="accent1"/>
+          </a:effectRef>
+          <a:fontRef idx="minor">
+            <a:schemeClr val="lt1"/>
+          </a:fontRef>
+        </p:style>
+        <p:txBody>
+          <a:bodyPr rtlCol="0" anchor="ctr"/>
+          <a:lstStyle/>
+          <a:p>
+            <a:pPr marL="457200" marR="0" lvl="0" indent="-457200" algn="l" defTabSz="914400" rtl="0" eaLnBrk="1" fontAlgn="auto" latinLnBrk="0" hangingPunct="1">
+              <a:lnSpc>
+                <a:spcPct val="120000"/>
+              </a:lnSpc>
+              <a:spcBef>
+                <a:spcPts val="1000"/>
+              </a:spcBef>
+              <a:spcAft>
+                <a:spcPts val="0"/>
+              </a:spcAft>
+              <a:buClr>
+                <a:srgbClr val="B71E42"/>
+              </a:buClr>
+              <a:buSzPct val="100000"/>
+              <a:buFont typeface="Wingdings" panose="05000000000000000000" pitchFamily="2" charset="2"/>
+              <a:buChar char="q"/>
+              <a:tabLst/>
+              <a:defRPr/>
+            </a:pPr>
+            <a:r>
+              <a:rPr lang="en-US" sz="3200" dirty="0">
+                <a:solidFill>
+                  <a:prstClr val="black"/>
+                </a:solidFill>
+                <a:latin typeface="Gill Sans MT" panose="020B0502020104020203"/>
+              </a:rPr>
+              <a:t>Classes (entities)</a:t>
+            </a:r>
+          </a:p>
+          <a:p>
+            <a:pPr marL="457200" marR="0" lvl="0" indent="-457200" algn="l" defTabSz="914400" rtl="0" eaLnBrk="1" fontAlgn="auto" latinLnBrk="0" hangingPunct="1">
+              <a:lnSpc>
+                <a:spcPct val="120000"/>
+              </a:lnSpc>
+              <a:spcBef>
+                <a:spcPts val="1000"/>
+              </a:spcBef>
+              <a:spcAft>
+                <a:spcPts val="0"/>
+              </a:spcAft>
+              <a:buClr>
+                <a:srgbClr val="B71E42"/>
+              </a:buClr>
+              <a:buSzPct val="100000"/>
+              <a:buFont typeface="Wingdings" panose="05000000000000000000" pitchFamily="2" charset="2"/>
+              <a:buChar char="q"/>
+              <a:tabLst/>
+              <a:defRPr/>
+            </a:pPr>
+            <a:r>
+              <a:rPr lang="en-US" sz="3200" dirty="0">
+                <a:solidFill>
+                  <a:prstClr val="black"/>
+                </a:solidFill>
+                <a:latin typeface="Gill Sans MT" panose="020B0502020104020203"/>
+              </a:rPr>
+              <a:t>Attributes / methods </a:t>
+            </a:r>
+          </a:p>
+          <a:p>
+            <a:pPr marL="457200" marR="0" lvl="0" indent="-457200" algn="l" defTabSz="914400" rtl="0" eaLnBrk="1" fontAlgn="auto" latinLnBrk="0" hangingPunct="1">
+              <a:lnSpc>
+                <a:spcPct val="120000"/>
+              </a:lnSpc>
+              <a:spcBef>
+                <a:spcPts val="1000"/>
+              </a:spcBef>
+              <a:spcAft>
+                <a:spcPts val="0"/>
+              </a:spcAft>
+              <a:buClr>
+                <a:srgbClr val="B71E42"/>
+              </a:buClr>
+              <a:buSzPct val="100000"/>
+              <a:buFont typeface="Wingdings" panose="05000000000000000000" pitchFamily="2" charset="2"/>
+              <a:buChar char="q"/>
+              <a:tabLst/>
+              <a:defRPr/>
+            </a:pPr>
+            <a:r>
+              <a:rPr lang="en-US" sz="3200" dirty="0">
+                <a:solidFill>
+                  <a:prstClr val="black"/>
+                </a:solidFill>
+                <a:latin typeface="Gill Sans MT" panose="020B0502020104020203"/>
+              </a:rPr>
+              <a:t> Associations </a:t>
+            </a:r>
+          </a:p>
+          <a:p>
+            <a:pPr marL="457200" marR="0" lvl="0" indent="-457200" algn="l" defTabSz="914400" rtl="0" eaLnBrk="1" fontAlgn="auto" latinLnBrk="0" hangingPunct="1">
+              <a:lnSpc>
+                <a:spcPct val="120000"/>
+              </a:lnSpc>
+              <a:spcBef>
+                <a:spcPts val="1000"/>
+              </a:spcBef>
+              <a:spcAft>
+                <a:spcPts val="0"/>
+              </a:spcAft>
+              <a:buClr>
+                <a:srgbClr val="B71E42"/>
+              </a:buClr>
+              <a:buSzPct val="100000"/>
+              <a:buFont typeface="Wingdings" panose="05000000000000000000" pitchFamily="2" charset="2"/>
+              <a:buChar char="q"/>
+              <a:tabLst/>
+              <a:defRPr/>
+            </a:pPr>
+            <a:r>
+              <a:rPr lang="en-US" sz="3200" dirty="0">
+                <a:solidFill>
+                  <a:prstClr val="black"/>
+                </a:solidFill>
+                <a:latin typeface="Gill Sans MT" panose="020B0502020104020203"/>
+              </a:rPr>
+              <a:t>Multiplicities </a:t>
+            </a:r>
           </a:p>
           <a:p>
             <a:pPr marR="0" lvl="0" algn="l" defTabSz="914400" rtl="0" eaLnBrk="1" fontAlgn="auto" latinLnBrk="0" hangingPunct="1">
@@ -14259,6 +14641,167 @@
               </a:solidFill>
               <a:latin typeface="Gill Sans MT" panose="020B0502020104020203"/>
             </a:endParaRPr>
+          </a:p>
+          <a:p>
+            <a:pPr marR="0" lvl="0" algn="l" defTabSz="914400" rtl="0" eaLnBrk="1" fontAlgn="auto" latinLnBrk="0" hangingPunct="1">
+              <a:lnSpc>
+                <a:spcPct val="120000"/>
+              </a:lnSpc>
+              <a:spcBef>
+                <a:spcPts val="1000"/>
+              </a:spcBef>
+              <a:spcAft>
+                <a:spcPts val="0"/>
+              </a:spcAft>
+              <a:buClr>
+                <a:srgbClr val="B71E42"/>
+              </a:buClr>
+              <a:buSzPct val="100000"/>
+              <a:tabLst/>
+              <a:defRPr/>
+            </a:pPr>
+            <a:endParaRPr lang="en-US" sz="4400" dirty="0">
+              <a:solidFill>
+                <a:prstClr val="black"/>
+              </a:solidFill>
+              <a:latin typeface="Gill Sans MT" panose="020B0502020104020203"/>
+            </a:endParaRPr>
+          </a:p>
+        </p:txBody>
+      </p:sp>
+      <p:sp>
+        <p:nvSpPr>
+          <p:cNvPr id="4" name="Rectangle 3">
+            <a:extLst>
+              <a:ext uri="{FF2B5EF4-FFF2-40B4-BE49-F238E27FC236}">
+                <a16:creationId xmlns:a16="http://schemas.microsoft.com/office/drawing/2014/main" id="{21196F1C-16DF-4973-A834-33FBC59C94AB}"/>
+              </a:ext>
+            </a:extLst>
+          </p:cNvPr>
+          <p:cNvSpPr/>
+          <p:nvPr/>
+        </p:nvSpPr>
+        <p:spPr>
+          <a:xfrm>
+            <a:off x="6912990" y="1960775"/>
+            <a:ext cx="4700834" cy="3921551"/>
+          </a:xfrm>
+          <a:prstGeom prst="rect">
+            <a:avLst/>
+          </a:prstGeom>
+          <a:noFill/>
+          <a:ln>
+            <a:noFill/>
+          </a:ln>
+        </p:spPr>
+        <p:style>
+          <a:lnRef idx="2">
+            <a:schemeClr val="accent1">
+              <a:shade val="50000"/>
+            </a:schemeClr>
+          </a:lnRef>
+          <a:fillRef idx="1">
+            <a:schemeClr val="accent1"/>
+          </a:fillRef>
+          <a:effectRef idx="0">
+            <a:schemeClr val="accent1"/>
+          </a:effectRef>
+          <a:fontRef idx="minor">
+            <a:schemeClr val="lt1"/>
+          </a:fontRef>
+        </p:style>
+        <p:txBody>
+          <a:bodyPr rtlCol="0" anchor="ctr"/>
+          <a:lstStyle/>
+          <a:p>
+            <a:pPr marL="457200" marR="0" lvl="0" indent="-457200" algn="l" defTabSz="914400" rtl="0" eaLnBrk="1" fontAlgn="auto" latinLnBrk="0" hangingPunct="1">
+              <a:lnSpc>
+                <a:spcPct val="120000"/>
+              </a:lnSpc>
+              <a:spcBef>
+                <a:spcPts val="1000"/>
+              </a:spcBef>
+              <a:spcAft>
+                <a:spcPts val="0"/>
+              </a:spcAft>
+              <a:buClr>
+                <a:srgbClr val="B71E42"/>
+              </a:buClr>
+              <a:buSzPct val="100000"/>
+              <a:buFont typeface="Wingdings" panose="05000000000000000000" pitchFamily="2" charset="2"/>
+              <a:buChar char="q"/>
+              <a:tabLst/>
+              <a:defRPr/>
+            </a:pPr>
+            <a:r>
+              <a:rPr lang="en-US" sz="3200" dirty="0">
+                <a:solidFill>
+                  <a:prstClr val="black"/>
+                </a:solidFill>
+                <a:latin typeface="Gill Sans MT" panose="020B0502020104020203"/>
+              </a:rPr>
+              <a:t>Nodes </a:t>
+            </a:r>
+          </a:p>
+          <a:p>
+            <a:pPr marL="457200" marR="0" lvl="0" indent="-457200" algn="l" defTabSz="914400" rtl="0" eaLnBrk="1" fontAlgn="auto" latinLnBrk="0" hangingPunct="1">
+              <a:lnSpc>
+                <a:spcPct val="120000"/>
+              </a:lnSpc>
+              <a:spcBef>
+                <a:spcPts val="1000"/>
+              </a:spcBef>
+              <a:spcAft>
+                <a:spcPts val="0"/>
+              </a:spcAft>
+              <a:buClr>
+                <a:srgbClr val="B71E42"/>
+              </a:buClr>
+              <a:buSzPct val="100000"/>
+              <a:buFont typeface="Wingdings" panose="05000000000000000000" pitchFamily="2" charset="2"/>
+              <a:buChar char="q"/>
+              <a:tabLst/>
+              <a:defRPr/>
+            </a:pPr>
+            <a:r>
+              <a:rPr lang="en-US" sz="3200" dirty="0">
+                <a:solidFill>
+                  <a:prstClr val="black"/>
+                </a:solidFill>
+                <a:latin typeface="Gill Sans MT" panose="020B0502020104020203"/>
+              </a:rPr>
+              <a:t>Components </a:t>
+            </a:r>
+          </a:p>
+          <a:p>
+            <a:pPr marL="457200" marR="0" lvl="0" indent="-457200" algn="l" defTabSz="914400" rtl="0" eaLnBrk="1" fontAlgn="auto" latinLnBrk="0" hangingPunct="1">
+              <a:lnSpc>
+                <a:spcPct val="120000"/>
+              </a:lnSpc>
+              <a:spcBef>
+                <a:spcPts val="1000"/>
+              </a:spcBef>
+              <a:spcAft>
+                <a:spcPts val="0"/>
+              </a:spcAft>
+              <a:buClr>
+                <a:srgbClr val="B71E42"/>
+              </a:buClr>
+              <a:buSzPct val="100000"/>
+              <a:buFont typeface="Wingdings" panose="05000000000000000000" pitchFamily="2" charset="2"/>
+              <a:buChar char="q"/>
+              <a:tabLst/>
+              <a:defRPr/>
+            </a:pPr>
+            <a:r>
+              <a:rPr lang="en-US" sz="3200" dirty="0">
+                <a:solidFill>
+                  <a:prstClr val="black"/>
+                </a:solidFill>
+                <a:latin typeface="Gill Sans MT" panose="020B0502020104020203"/>
+              </a:rPr>
+              <a:t>Communication paths  </a:t>
+            </a:r>
           </a:p>
           <a:p>
             <a:pPr marR="0" lvl="0" algn="l" defTabSz="914400" rtl="0" eaLnBrk="1" fontAlgn="auto" latinLnBrk="0" hangingPunct="1">
@@ -15229,7 +15772,7 @@
             <a:pPr algn="ctr"/>
             <a:r>
               <a:rPr lang="en-US" sz="2800" dirty="0"/>
-              <a:t> Requirements analysis overview</a:t>
+              <a:t> </a:t>
             </a:r>
           </a:p>
         </p:txBody>
@@ -15416,8 +15959,8 @@
         </p:nvSpPr>
         <p:spPr>
           <a:xfrm>
-            <a:off x="6724453" y="2264968"/>
-            <a:ext cx="5467547" cy="3117738"/>
+            <a:off x="6903563" y="1791093"/>
+            <a:ext cx="4700834" cy="3921551"/>
           </a:xfrm>
           <a:prstGeom prst="rect">
             <a:avLst/>
@@ -15447,7 +15990,7 @@
           <a:bodyPr rtlCol="0" anchor="ctr"/>
           <a:lstStyle/>
           <a:p>
-            <a:pPr marR="0" lvl="0" algn="l" defTabSz="914400" rtl="0" eaLnBrk="1" fontAlgn="auto" latinLnBrk="0" hangingPunct="1">
+            <a:pPr marL="457200" marR="0" lvl="0" indent="-457200" algn="l" defTabSz="914400" rtl="0" eaLnBrk="1" fontAlgn="auto" latinLnBrk="0" hangingPunct="1">
               <a:lnSpc>
                 <a:spcPct val="120000"/>
               </a:lnSpc>
@@ -15461,15 +16004,80 @@
                 <a:srgbClr val="B71E42"/>
               </a:buClr>
               <a:buSzPct val="100000"/>
+              <a:buFont typeface="Wingdings" panose="05000000000000000000" pitchFamily="2" charset="2"/>
+              <a:buChar char="q"/>
               <a:tabLst/>
               <a:defRPr/>
             </a:pPr>
-            <a:endParaRPr lang="en-US" sz="3200" dirty="0">
-              <a:solidFill>
-                <a:prstClr val="black"/>
-              </a:solidFill>
-              <a:latin typeface="Gill Sans MT" panose="020B0502020104020203"/>
-            </a:endParaRPr>
+            <a:r>
+              <a:rPr lang="en-US" sz="3200" dirty="0">
+                <a:solidFill>
+                  <a:prstClr val="black"/>
+                </a:solidFill>
+                <a:latin typeface="Gill Sans MT" panose="020B0502020104020203"/>
+              </a:rPr>
+              <a:t>Layers </a:t>
+            </a:r>
+          </a:p>
+          <a:p>
+            <a:pPr marL="457200" marR="0" lvl="0" indent="-457200" algn="l" defTabSz="914400" rtl="0" eaLnBrk="1" fontAlgn="auto" latinLnBrk="0" hangingPunct="1">
+              <a:lnSpc>
+                <a:spcPct val="120000"/>
+              </a:lnSpc>
+              <a:spcBef>
+                <a:spcPts val="1000"/>
+              </a:spcBef>
+              <a:spcAft>
+                <a:spcPts val="0"/>
+              </a:spcAft>
+              <a:buClr>
+                <a:srgbClr val="B71E42"/>
+              </a:buClr>
+              <a:buSzPct val="100000"/>
+              <a:buFont typeface="Wingdings" panose="05000000000000000000" pitchFamily="2" charset="2"/>
+              <a:buChar char="q"/>
+              <a:tabLst/>
+              <a:defRPr/>
+            </a:pPr>
+            <a:r>
+              <a:rPr lang="en-US" sz="3200" dirty="0">
+                <a:solidFill>
+                  <a:prstClr val="black"/>
+                </a:solidFill>
+                <a:latin typeface="Gill Sans MT" panose="020B0502020104020203"/>
+              </a:rPr>
+              <a:t>Components </a:t>
+            </a:r>
+          </a:p>
+          <a:p>
+            <a:pPr marL="457200" marR="0" lvl="0" indent="-457200" algn="l" defTabSz="914400" rtl="0" eaLnBrk="1" fontAlgn="auto" latinLnBrk="0" hangingPunct="1">
+              <a:lnSpc>
+                <a:spcPct val="120000"/>
+              </a:lnSpc>
+              <a:spcBef>
+                <a:spcPts val="1000"/>
+              </a:spcBef>
+              <a:spcAft>
+                <a:spcPts val="0"/>
+              </a:spcAft>
+              <a:buClr>
+                <a:srgbClr val="B71E42"/>
+              </a:buClr>
+              <a:buSzPct val="100000"/>
+              <a:buFont typeface="Wingdings" panose="05000000000000000000" pitchFamily="2" charset="2"/>
+              <a:buChar char="q"/>
+              <a:tabLst/>
+              <a:defRPr/>
+            </a:pPr>
+            <a:r>
+              <a:rPr lang="en-US" sz="3200" dirty="0">
+                <a:solidFill>
+                  <a:prstClr val="black"/>
+                </a:solidFill>
+                <a:latin typeface="Gill Sans MT" panose="020B0502020104020203"/>
+              </a:rPr>
+              <a:t>Sub-modules </a:t>
+            </a:r>
           </a:p>
           <a:p>
             <a:pPr marR="0" lvl="0" algn="l" defTabSz="914400" rtl="0" eaLnBrk="1" fontAlgn="auto" latinLnBrk="0" hangingPunct="1">
@@ -15726,6 +16334,167 @@
           </a:p>
         </p:txBody>
       </p:sp>
+      <p:sp>
+        <p:nvSpPr>
+          <p:cNvPr id="4" name="Rectangle 3">
+            <a:extLst>
+              <a:ext uri="{FF2B5EF4-FFF2-40B4-BE49-F238E27FC236}">
+                <a16:creationId xmlns:a16="http://schemas.microsoft.com/office/drawing/2014/main" id="{AA47CAB9-75BF-45BC-AF13-31865EED82D9}"/>
+              </a:ext>
+            </a:extLst>
+          </p:cNvPr>
+          <p:cNvSpPr/>
+          <p:nvPr/>
+        </p:nvSpPr>
+        <p:spPr>
+          <a:xfrm>
+            <a:off x="6903563" y="1791093"/>
+            <a:ext cx="4700834" cy="3921551"/>
+          </a:xfrm>
+          <a:prstGeom prst="rect">
+            <a:avLst/>
+          </a:prstGeom>
+          <a:noFill/>
+          <a:ln>
+            <a:noFill/>
+          </a:ln>
+        </p:spPr>
+        <p:style>
+          <a:lnRef idx="2">
+            <a:schemeClr val="accent1">
+              <a:shade val="50000"/>
+            </a:schemeClr>
+          </a:lnRef>
+          <a:fillRef idx="1">
+            <a:schemeClr val="accent1"/>
+          </a:fillRef>
+          <a:effectRef idx="0">
+            <a:schemeClr val="accent1"/>
+          </a:effectRef>
+          <a:fontRef idx="minor">
+            <a:schemeClr val="lt1"/>
+          </a:fontRef>
+        </p:style>
+        <p:txBody>
+          <a:bodyPr rtlCol="0" anchor="ctr"/>
+          <a:lstStyle/>
+          <a:p>
+            <a:pPr marL="457200" marR="0" lvl="0" indent="-457200" algn="l" defTabSz="914400" rtl="0" eaLnBrk="1" fontAlgn="auto" latinLnBrk="0" hangingPunct="1">
+              <a:lnSpc>
+                <a:spcPct val="120000"/>
+              </a:lnSpc>
+              <a:spcBef>
+                <a:spcPts val="1000"/>
+              </a:spcBef>
+              <a:spcAft>
+                <a:spcPts val="0"/>
+              </a:spcAft>
+              <a:buClr>
+                <a:srgbClr val="B71E42"/>
+              </a:buClr>
+              <a:buSzPct val="100000"/>
+              <a:buFont typeface="Wingdings" panose="05000000000000000000" pitchFamily="2" charset="2"/>
+              <a:buChar char="q"/>
+              <a:tabLst/>
+              <a:defRPr/>
+            </a:pPr>
+            <a:r>
+              <a:rPr lang="en-US" sz="3200" dirty="0">
+                <a:solidFill>
+                  <a:prstClr val="black"/>
+                </a:solidFill>
+                <a:latin typeface="Gill Sans MT" panose="020B0502020104020203"/>
+              </a:rPr>
+              <a:t>System</a:t>
+            </a:r>
+          </a:p>
+          <a:p>
+            <a:pPr marL="457200" marR="0" lvl="0" indent="-457200" algn="l" defTabSz="914400" rtl="0" eaLnBrk="1" fontAlgn="auto" latinLnBrk="0" hangingPunct="1">
+              <a:lnSpc>
+                <a:spcPct val="120000"/>
+              </a:lnSpc>
+              <a:spcBef>
+                <a:spcPts val="1000"/>
+              </a:spcBef>
+              <a:spcAft>
+                <a:spcPts val="0"/>
+              </a:spcAft>
+              <a:buClr>
+                <a:srgbClr val="B71E42"/>
+              </a:buClr>
+              <a:buSzPct val="100000"/>
+              <a:buFont typeface="Wingdings" panose="05000000000000000000" pitchFamily="2" charset="2"/>
+              <a:buChar char="q"/>
+              <a:tabLst/>
+              <a:defRPr/>
+            </a:pPr>
+            <a:r>
+              <a:rPr lang="en-US" sz="3200" dirty="0">
+                <a:solidFill>
+                  <a:prstClr val="black"/>
+                </a:solidFill>
+                <a:latin typeface="Gill Sans MT" panose="020B0502020104020203"/>
+              </a:rPr>
+              <a:t>External actors </a:t>
+            </a:r>
+          </a:p>
+          <a:p>
+            <a:pPr marL="457200" marR="0" lvl="0" indent="-457200" algn="l" defTabSz="914400" rtl="0" eaLnBrk="1" fontAlgn="auto" latinLnBrk="0" hangingPunct="1">
+              <a:lnSpc>
+                <a:spcPct val="120000"/>
+              </a:lnSpc>
+              <a:spcBef>
+                <a:spcPts val="1000"/>
+              </a:spcBef>
+              <a:spcAft>
+                <a:spcPts val="0"/>
+              </a:spcAft>
+              <a:buClr>
+                <a:srgbClr val="B71E42"/>
+              </a:buClr>
+              <a:buSzPct val="100000"/>
+              <a:buFont typeface="Wingdings" panose="05000000000000000000" pitchFamily="2" charset="2"/>
+              <a:buChar char="q"/>
+              <a:tabLst/>
+              <a:defRPr/>
+            </a:pPr>
+            <a:r>
+              <a:rPr lang="en-US" sz="3200" dirty="0">
+                <a:solidFill>
+                  <a:prstClr val="black"/>
+                </a:solidFill>
+                <a:latin typeface="Gill Sans MT" panose="020B0502020104020203"/>
+              </a:rPr>
+              <a:t>Interactions </a:t>
+            </a:r>
+          </a:p>
+          <a:p>
+            <a:pPr marR="0" lvl="0" algn="l" defTabSz="914400" rtl="0" eaLnBrk="1" fontAlgn="auto" latinLnBrk="0" hangingPunct="1">
+              <a:lnSpc>
+                <a:spcPct val="120000"/>
+              </a:lnSpc>
+              <a:spcBef>
+                <a:spcPts val="1000"/>
+              </a:spcBef>
+              <a:spcAft>
+                <a:spcPts val="0"/>
+              </a:spcAft>
+              <a:buClr>
+                <a:srgbClr val="B71E42"/>
+              </a:buClr>
+              <a:buSzPct val="100000"/>
+              <a:tabLst/>
+              <a:defRPr/>
+            </a:pPr>
+            <a:endParaRPr lang="en-US" sz="4400" dirty="0">
+              <a:solidFill>
+                <a:prstClr val="black"/>
+              </a:solidFill>
+              <a:latin typeface="Gill Sans MT" panose="020B0502020104020203"/>
+            </a:endParaRPr>
+          </a:p>
+        </p:txBody>
+      </p:sp>
     </p:spTree>
     <p:extLst>
       <p:ext uri="{BB962C8B-B14F-4D97-AF65-F5344CB8AC3E}">
@@ -15924,6 +16693,197 @@
               </a:solidFill>
               <a:latin typeface="Gill Sans MT" panose="020B0502020104020203"/>
             </a:endParaRPr>
+          </a:p>
+          <a:p>
+            <a:pPr marR="0" lvl="0" algn="l" defTabSz="914400" rtl="0" eaLnBrk="1" fontAlgn="auto" latinLnBrk="0" hangingPunct="1">
+              <a:lnSpc>
+                <a:spcPct val="120000"/>
+              </a:lnSpc>
+              <a:spcBef>
+                <a:spcPts val="1000"/>
+              </a:spcBef>
+              <a:spcAft>
+                <a:spcPts val="0"/>
+              </a:spcAft>
+              <a:buClr>
+                <a:srgbClr val="B71E42"/>
+              </a:buClr>
+              <a:buSzPct val="100000"/>
+              <a:tabLst/>
+              <a:defRPr/>
+            </a:pPr>
+            <a:endParaRPr lang="en-US" sz="4400" dirty="0">
+              <a:solidFill>
+                <a:prstClr val="black"/>
+              </a:solidFill>
+              <a:latin typeface="Gill Sans MT" panose="020B0502020104020203"/>
+            </a:endParaRPr>
+          </a:p>
+        </p:txBody>
+      </p:sp>
+      <p:sp>
+        <p:nvSpPr>
+          <p:cNvPr id="4" name="Rectangle 3">
+            <a:extLst>
+              <a:ext uri="{FF2B5EF4-FFF2-40B4-BE49-F238E27FC236}">
+                <a16:creationId xmlns:a16="http://schemas.microsoft.com/office/drawing/2014/main" id="{DBB4145F-B1F3-4548-B783-90960C80D717}"/>
+              </a:ext>
+            </a:extLst>
+          </p:cNvPr>
+          <p:cNvSpPr/>
+          <p:nvPr/>
+        </p:nvSpPr>
+        <p:spPr>
+          <a:xfrm>
+            <a:off x="6903563" y="1791093"/>
+            <a:ext cx="4700834" cy="3921551"/>
+          </a:xfrm>
+          <a:prstGeom prst="rect">
+            <a:avLst/>
+          </a:prstGeom>
+          <a:noFill/>
+          <a:ln>
+            <a:noFill/>
+          </a:ln>
+        </p:spPr>
+        <p:style>
+          <a:lnRef idx="2">
+            <a:schemeClr val="accent1">
+              <a:shade val="50000"/>
+            </a:schemeClr>
+          </a:lnRef>
+          <a:fillRef idx="1">
+            <a:schemeClr val="accent1"/>
+          </a:fillRef>
+          <a:effectRef idx="0">
+            <a:schemeClr val="accent1"/>
+          </a:effectRef>
+          <a:fontRef idx="minor">
+            <a:schemeClr val="lt1"/>
+          </a:fontRef>
+        </p:style>
+        <p:txBody>
+          <a:bodyPr rtlCol="0" anchor="ctr"/>
+          <a:lstStyle/>
+          <a:p>
+            <a:pPr marL="457200" marR="0" lvl="0" indent="-457200" algn="l" defTabSz="914400" rtl="0" eaLnBrk="1" fontAlgn="auto" latinLnBrk="0" hangingPunct="1">
+              <a:lnSpc>
+                <a:spcPct val="120000"/>
+              </a:lnSpc>
+              <a:spcBef>
+                <a:spcPts val="1000"/>
+              </a:spcBef>
+              <a:spcAft>
+                <a:spcPts val="0"/>
+              </a:spcAft>
+              <a:buClr>
+                <a:srgbClr val="B71E42"/>
+              </a:buClr>
+              <a:buSzPct val="100000"/>
+              <a:buFont typeface="Wingdings" panose="05000000000000000000" pitchFamily="2" charset="2"/>
+              <a:buChar char="q"/>
+              <a:tabLst/>
+              <a:defRPr/>
+            </a:pPr>
+            <a:r>
+              <a:rPr lang="en-US" sz="3200" dirty="0">
+                <a:solidFill>
+                  <a:prstClr val="black"/>
+                </a:solidFill>
+                <a:latin typeface="Gill Sans MT" panose="020B0502020104020203"/>
+              </a:rPr>
+              <a:t>System</a:t>
+            </a:r>
+          </a:p>
+          <a:p>
+            <a:pPr marL="457200" marR="0" lvl="0" indent="-457200" algn="l" defTabSz="914400" rtl="0" eaLnBrk="1" fontAlgn="auto" latinLnBrk="0" hangingPunct="1">
+              <a:lnSpc>
+                <a:spcPct val="120000"/>
+              </a:lnSpc>
+              <a:spcBef>
+                <a:spcPts val="1000"/>
+              </a:spcBef>
+              <a:spcAft>
+                <a:spcPts val="0"/>
+              </a:spcAft>
+              <a:buClr>
+                <a:srgbClr val="B71E42"/>
+              </a:buClr>
+              <a:buSzPct val="100000"/>
+              <a:buFont typeface="Wingdings" panose="05000000000000000000" pitchFamily="2" charset="2"/>
+              <a:buChar char="q"/>
+              <a:tabLst/>
+              <a:defRPr/>
+            </a:pPr>
+            <a:r>
+              <a:rPr lang="en-US" sz="3200" dirty="0">
+                <a:solidFill>
+                  <a:prstClr val="black"/>
+                </a:solidFill>
+                <a:latin typeface="Gill Sans MT" panose="020B0502020104020203"/>
+              </a:rPr>
+              <a:t>Actors  </a:t>
+            </a:r>
+          </a:p>
+          <a:p>
+            <a:pPr marL="457200" marR="0" lvl="0" indent="-457200" algn="l" defTabSz="914400" rtl="0" eaLnBrk="1" fontAlgn="auto" latinLnBrk="0" hangingPunct="1">
+              <a:lnSpc>
+                <a:spcPct val="120000"/>
+              </a:lnSpc>
+              <a:spcBef>
+                <a:spcPts val="1000"/>
+              </a:spcBef>
+              <a:spcAft>
+                <a:spcPts val="0"/>
+              </a:spcAft>
+              <a:buClr>
+                <a:srgbClr val="B71E42"/>
+              </a:buClr>
+              <a:buSzPct val="100000"/>
+              <a:buFont typeface="Wingdings" panose="05000000000000000000" pitchFamily="2" charset="2"/>
+              <a:buChar char="q"/>
+              <a:tabLst/>
+              <a:defRPr/>
+            </a:pPr>
+            <a:r>
+              <a:rPr lang="en-US" sz="3200" dirty="0">
+                <a:solidFill>
+                  <a:prstClr val="black"/>
+                </a:solidFill>
+                <a:latin typeface="Gill Sans MT" panose="020B0502020104020203"/>
+              </a:rPr>
+              <a:t>Use-cases </a:t>
+            </a:r>
+          </a:p>
+          <a:p>
+            <a:pPr marL="457200" marR="0" lvl="0" indent="-457200" algn="l" defTabSz="914400" rtl="0" eaLnBrk="1" fontAlgn="auto" latinLnBrk="0" hangingPunct="1">
+              <a:lnSpc>
+                <a:spcPct val="120000"/>
+              </a:lnSpc>
+              <a:spcBef>
+                <a:spcPts val="1000"/>
+              </a:spcBef>
+              <a:spcAft>
+                <a:spcPts val="0"/>
+              </a:spcAft>
+              <a:buClr>
+                <a:srgbClr val="B71E42"/>
+              </a:buClr>
+              <a:buSzPct val="100000"/>
+              <a:buFont typeface="Wingdings" panose="05000000000000000000" pitchFamily="2" charset="2"/>
+              <a:buChar char="q"/>
+              <a:tabLst/>
+              <a:defRPr/>
+            </a:pPr>
+            <a:r>
+              <a:rPr lang="en-US" sz="3200" dirty="0">
+                <a:solidFill>
+                  <a:prstClr val="black"/>
+                </a:solidFill>
+                <a:latin typeface="Gill Sans MT" panose="020B0502020104020203"/>
+              </a:rPr>
+              <a:t>Relationships </a:t>
+            </a:r>
           </a:p>
           <a:p>
             <a:pPr marR="0" lvl="0" algn="l" defTabSz="914400" rtl="0" eaLnBrk="1" fontAlgn="auto" latinLnBrk="0" hangingPunct="1">

</xml_diff>